<commit_message>
Reworked text and figures. Included better discussion of filling factor dependence and also a discussion of symmetric transitions. Rewrote introduction
</commit_message>
<xml_diff>
--- a/images/fig3_alt.pptx
+++ b/images/fig3_alt.pptx
@@ -288,7 +288,7 @@
           <a:p>
             <a:fld id="{9C47C307-1373-4E04-808A-D980B6B96844}" type="datetimeFigureOut">
               <a:rPr lang="en-US" smtClean="0"/>
-              <a:t>6/17/2013</a:t>
+              <a:t>7/2/2013</a:t>
             </a:fld>
             <a:endParaRPr lang="en-US"/>
           </a:p>
@@ -458,7 +458,7 @@
           <a:p>
             <a:fld id="{9C47C307-1373-4E04-808A-D980B6B96844}" type="datetimeFigureOut">
               <a:rPr lang="en-US" smtClean="0"/>
-              <a:t>6/17/2013</a:t>
+              <a:t>7/2/2013</a:t>
             </a:fld>
             <a:endParaRPr lang="en-US"/>
           </a:p>
@@ -638,7 +638,7 @@
           <a:p>
             <a:fld id="{9C47C307-1373-4E04-808A-D980B6B96844}" type="datetimeFigureOut">
               <a:rPr lang="en-US" smtClean="0"/>
-              <a:t>6/17/2013</a:t>
+              <a:t>7/2/2013</a:t>
             </a:fld>
             <a:endParaRPr lang="en-US"/>
           </a:p>
@@ -808,7 +808,7 @@
           <a:p>
             <a:fld id="{9C47C307-1373-4E04-808A-D980B6B96844}" type="datetimeFigureOut">
               <a:rPr lang="en-US" smtClean="0"/>
-              <a:t>6/17/2013</a:t>
+              <a:t>7/2/2013</a:t>
             </a:fld>
             <a:endParaRPr lang="en-US"/>
           </a:p>
@@ -1054,7 +1054,7 @@
           <a:p>
             <a:fld id="{9C47C307-1373-4E04-808A-D980B6B96844}" type="datetimeFigureOut">
               <a:rPr lang="en-US" smtClean="0"/>
-              <a:t>6/17/2013</a:t>
+              <a:t>7/2/2013</a:t>
             </a:fld>
             <a:endParaRPr lang="en-US"/>
           </a:p>
@@ -1342,7 +1342,7 @@
           <a:p>
             <a:fld id="{9C47C307-1373-4E04-808A-D980B6B96844}" type="datetimeFigureOut">
               <a:rPr lang="en-US" smtClean="0"/>
-              <a:t>6/17/2013</a:t>
+              <a:t>7/2/2013</a:t>
             </a:fld>
             <a:endParaRPr lang="en-US"/>
           </a:p>
@@ -1764,7 +1764,7 @@
           <a:p>
             <a:fld id="{9C47C307-1373-4E04-808A-D980B6B96844}" type="datetimeFigureOut">
               <a:rPr lang="en-US" smtClean="0"/>
-              <a:t>6/17/2013</a:t>
+              <a:t>7/2/2013</a:t>
             </a:fld>
             <a:endParaRPr lang="en-US"/>
           </a:p>
@@ -1882,7 +1882,7 @@
           <a:p>
             <a:fld id="{9C47C307-1373-4E04-808A-D980B6B96844}" type="datetimeFigureOut">
               <a:rPr lang="en-US" smtClean="0"/>
-              <a:t>6/17/2013</a:t>
+              <a:t>7/2/2013</a:t>
             </a:fld>
             <a:endParaRPr lang="en-US"/>
           </a:p>
@@ -1977,7 +1977,7 @@
           <a:p>
             <a:fld id="{9C47C307-1373-4E04-808A-D980B6B96844}" type="datetimeFigureOut">
               <a:rPr lang="en-US" smtClean="0"/>
-              <a:t>6/17/2013</a:t>
+              <a:t>7/2/2013</a:t>
             </a:fld>
             <a:endParaRPr lang="en-US"/>
           </a:p>
@@ -2254,7 +2254,7 @@
           <a:p>
             <a:fld id="{9C47C307-1373-4E04-808A-D980B6B96844}" type="datetimeFigureOut">
               <a:rPr lang="en-US" smtClean="0"/>
-              <a:t>6/17/2013</a:t>
+              <a:t>7/2/2013</a:t>
             </a:fld>
             <a:endParaRPr lang="en-US"/>
           </a:p>
@@ -2507,7 +2507,7 @@
           <a:p>
             <a:fld id="{9C47C307-1373-4E04-808A-D980B6B96844}" type="datetimeFigureOut">
               <a:rPr lang="en-US" smtClean="0"/>
-              <a:t>6/17/2013</a:t>
+              <a:t>7/2/2013</a:t>
             </a:fld>
             <a:endParaRPr lang="en-US"/>
           </a:p>
@@ -2720,7 +2720,7 @@
           <a:p>
             <a:fld id="{9C47C307-1373-4E04-808A-D980B6B96844}" type="datetimeFigureOut">
               <a:rPr lang="en-US" smtClean="0"/>
-              <a:t>6/17/2013</a:t>
+              <a:t>7/2/2013</a:t>
             </a:fld>
             <a:endParaRPr lang="en-US"/>
           </a:p>
@@ -3095,16 +3095,990 @@
           <a:chExt cx="0" cy="0"/>
         </a:xfrm>
       </p:grpSpPr>
+      <p:grpSp>
+        <p:nvGrpSpPr>
+          <p:cNvPr id="3" name="Group 2"/>
+          <p:cNvGrpSpPr/>
+          <p:nvPr/>
+        </p:nvGrpSpPr>
+        <p:grpSpPr>
+          <a:xfrm>
+            <a:off x="96572" y="106825"/>
+            <a:ext cx="992263" cy="2333240"/>
+            <a:chOff x="2362200" y="205812"/>
+            <a:chExt cx="992263" cy="2333240"/>
+          </a:xfrm>
+        </p:grpSpPr>
+        <p:grpSp>
+          <p:nvGrpSpPr>
+            <p:cNvPr id="63" name="Group 62"/>
+            <p:cNvGrpSpPr/>
+            <p:nvPr/>
+          </p:nvGrpSpPr>
+          <p:grpSpPr>
+            <a:xfrm>
+              <a:off x="2362200" y="205812"/>
+              <a:ext cx="992263" cy="2331575"/>
+              <a:chOff x="1513514" y="-159282"/>
+              <a:chExt cx="1603956" cy="1818530"/>
+            </a:xfrm>
+          </p:grpSpPr>
+          <p:cxnSp>
+            <p:nvCxnSpPr>
+              <p:cNvPr id="64" name="Straight Arrow Connector 63"/>
+              <p:cNvCxnSpPr/>
+              <p:nvPr/>
+            </p:nvCxnSpPr>
+            <p:spPr>
+              <a:xfrm flipV="1">
+                <a:off x="1782762" y="167481"/>
+                <a:ext cx="0" cy="1491767"/>
+              </a:xfrm>
+              <a:prstGeom prst="straightConnector1">
+                <a:avLst/>
+              </a:prstGeom>
+              <a:ln>
+                <a:solidFill>
+                  <a:schemeClr val="tx1"/>
+                </a:solidFill>
+                <a:tailEnd type="arrow"/>
+              </a:ln>
+            </p:spPr>
+            <p:style>
+              <a:lnRef idx="1">
+                <a:schemeClr val="accent1"/>
+              </a:lnRef>
+              <a:fillRef idx="0">
+                <a:schemeClr val="accent1"/>
+              </a:fillRef>
+              <a:effectRef idx="0">
+                <a:schemeClr val="accent1"/>
+              </a:effectRef>
+              <a:fontRef idx="minor">
+                <a:schemeClr val="tx1"/>
+              </a:fontRef>
+            </p:style>
+          </p:cxnSp>
+          <p:cxnSp>
+            <p:nvCxnSpPr>
+              <p:cNvPr id="65" name="Straight Connector 64"/>
+              <p:cNvCxnSpPr/>
+              <p:nvPr/>
+            </p:nvCxnSpPr>
+            <p:spPr>
+              <a:xfrm flipV="1">
+                <a:off x="1858962" y="924590"/>
+                <a:ext cx="914400" cy="4892"/>
+              </a:xfrm>
+              <a:prstGeom prst="line">
+                <a:avLst/>
+              </a:prstGeom>
+              <a:ln w="19050">
+                <a:solidFill>
+                  <a:srgbClr val="FFC000"/>
+                </a:solidFill>
+              </a:ln>
+            </p:spPr>
+            <p:style>
+              <a:lnRef idx="1">
+                <a:schemeClr val="accent1"/>
+              </a:lnRef>
+              <a:fillRef idx="0">
+                <a:schemeClr val="accent1"/>
+              </a:fillRef>
+              <a:effectRef idx="0">
+                <a:schemeClr val="accent1"/>
+              </a:effectRef>
+              <a:fontRef idx="minor">
+                <a:schemeClr val="tx1"/>
+              </a:fontRef>
+            </p:style>
+          </p:cxnSp>
+          <p:cxnSp>
+            <p:nvCxnSpPr>
+              <p:cNvPr id="66" name="Straight Connector 65"/>
+              <p:cNvCxnSpPr/>
+              <p:nvPr/>
+            </p:nvCxnSpPr>
+            <p:spPr>
+              <a:xfrm>
+                <a:off x="1858962" y="1310481"/>
+                <a:ext cx="914400" cy="0"/>
+              </a:xfrm>
+              <a:prstGeom prst="line">
+                <a:avLst/>
+              </a:prstGeom>
+              <a:ln w="19050">
+                <a:solidFill>
+                  <a:srgbClr val="FFC000"/>
+                </a:solidFill>
+              </a:ln>
+            </p:spPr>
+            <p:style>
+              <a:lnRef idx="1">
+                <a:schemeClr val="accent1"/>
+              </a:lnRef>
+              <a:fillRef idx="0">
+                <a:schemeClr val="accent1"/>
+              </a:fillRef>
+              <a:effectRef idx="0">
+                <a:schemeClr val="accent1"/>
+              </a:effectRef>
+              <a:fontRef idx="minor">
+                <a:schemeClr val="tx1"/>
+              </a:fontRef>
+            </p:style>
+          </p:cxnSp>
+          <p:cxnSp>
+            <p:nvCxnSpPr>
+              <p:cNvPr id="67" name="Straight Connector 66"/>
+              <p:cNvCxnSpPr/>
+              <p:nvPr/>
+            </p:nvCxnSpPr>
+            <p:spPr>
+              <a:xfrm>
+                <a:off x="1858962" y="548481"/>
+                <a:ext cx="914400" cy="0"/>
+              </a:xfrm>
+              <a:prstGeom prst="line">
+                <a:avLst/>
+              </a:prstGeom>
+              <a:ln w="19050">
+                <a:solidFill>
+                  <a:schemeClr val="tx1"/>
+                </a:solidFill>
+              </a:ln>
+            </p:spPr>
+            <p:style>
+              <a:lnRef idx="1">
+                <a:schemeClr val="accent1"/>
+              </a:lnRef>
+              <a:fillRef idx="0">
+                <a:schemeClr val="accent1"/>
+              </a:fillRef>
+              <a:effectRef idx="0">
+                <a:schemeClr val="accent1"/>
+              </a:effectRef>
+              <a:fontRef idx="minor">
+                <a:schemeClr val="tx1"/>
+              </a:fontRef>
+            </p:style>
+          </p:cxnSp>
+          <p:cxnSp>
+            <p:nvCxnSpPr>
+              <p:cNvPr id="68" name="Straight Connector 67"/>
+              <p:cNvCxnSpPr/>
+              <p:nvPr/>
+            </p:nvCxnSpPr>
+            <p:spPr>
+              <a:xfrm>
+                <a:off x="1858962" y="396081"/>
+                <a:ext cx="914400" cy="0"/>
+              </a:xfrm>
+              <a:prstGeom prst="line">
+                <a:avLst/>
+              </a:prstGeom>
+              <a:ln w="19050">
+                <a:solidFill>
+                  <a:schemeClr val="tx1"/>
+                </a:solidFill>
+              </a:ln>
+            </p:spPr>
+            <p:style>
+              <a:lnRef idx="1">
+                <a:schemeClr val="accent1"/>
+              </a:lnRef>
+              <a:fillRef idx="0">
+                <a:schemeClr val="accent1"/>
+              </a:fillRef>
+              <a:effectRef idx="0">
+                <a:schemeClr val="accent1"/>
+              </a:effectRef>
+              <a:fontRef idx="minor">
+                <a:schemeClr val="tx1"/>
+              </a:fontRef>
+            </p:style>
+          </p:cxnSp>
+          <p:cxnSp>
+            <p:nvCxnSpPr>
+              <p:cNvPr id="69" name="Straight Connector 68"/>
+              <p:cNvCxnSpPr/>
+              <p:nvPr/>
+            </p:nvCxnSpPr>
+            <p:spPr>
+              <a:xfrm>
+                <a:off x="1858962" y="1462881"/>
+                <a:ext cx="914400" cy="0"/>
+              </a:xfrm>
+              <a:prstGeom prst="line">
+                <a:avLst/>
+              </a:prstGeom>
+              <a:ln w="19050">
+                <a:solidFill>
+                  <a:srgbClr val="FFC000"/>
+                </a:solidFill>
+              </a:ln>
+            </p:spPr>
+            <p:style>
+              <a:lnRef idx="1">
+                <a:schemeClr val="accent1"/>
+              </a:lnRef>
+              <a:fillRef idx="0">
+                <a:schemeClr val="accent1"/>
+              </a:fillRef>
+              <a:effectRef idx="0">
+                <a:schemeClr val="accent1"/>
+              </a:effectRef>
+              <a:fontRef idx="minor">
+                <a:schemeClr val="tx1"/>
+              </a:fontRef>
+            </p:style>
+          </p:cxnSp>
+          <p:cxnSp>
+            <p:nvCxnSpPr>
+              <p:cNvPr id="70" name="Straight Arrow Connector 69"/>
+              <p:cNvCxnSpPr/>
+              <p:nvPr/>
+            </p:nvCxnSpPr>
+            <p:spPr>
+              <a:xfrm flipV="1">
+                <a:off x="1935162" y="548481"/>
+                <a:ext cx="0" cy="381000"/>
+              </a:xfrm>
+              <a:prstGeom prst="straightConnector1">
+                <a:avLst/>
+              </a:prstGeom>
+              <a:ln>
+                <a:solidFill>
+                  <a:srgbClr val="FF0000"/>
+                </a:solidFill>
+                <a:prstDash val="solid"/>
+                <a:tailEnd type="arrow"/>
+              </a:ln>
+            </p:spPr>
+            <p:style>
+              <a:lnRef idx="1">
+                <a:schemeClr val="accent1"/>
+              </a:lnRef>
+              <a:fillRef idx="0">
+                <a:schemeClr val="accent1"/>
+              </a:fillRef>
+              <a:effectRef idx="0">
+                <a:schemeClr val="accent1"/>
+              </a:effectRef>
+              <a:fontRef idx="minor">
+                <a:schemeClr val="tx1"/>
+              </a:fontRef>
+            </p:style>
+          </p:cxnSp>
+          <p:cxnSp>
+            <p:nvCxnSpPr>
+              <p:cNvPr id="71" name="Straight Arrow Connector 70"/>
+              <p:cNvCxnSpPr/>
+              <p:nvPr/>
+            </p:nvCxnSpPr>
+            <p:spPr>
+              <a:xfrm flipV="1">
+                <a:off x="1935162" y="929481"/>
+                <a:ext cx="0" cy="381000"/>
+              </a:xfrm>
+              <a:prstGeom prst="straightConnector1">
+                <a:avLst/>
+              </a:prstGeom>
+              <a:ln>
+                <a:solidFill>
+                  <a:srgbClr val="170CFA"/>
+                </a:solidFill>
+                <a:prstDash val="sysDash"/>
+                <a:tailEnd type="arrow"/>
+              </a:ln>
+            </p:spPr>
+            <p:style>
+              <a:lnRef idx="1">
+                <a:schemeClr val="accent1"/>
+              </a:lnRef>
+              <a:fillRef idx="0">
+                <a:schemeClr val="accent1"/>
+              </a:fillRef>
+              <a:effectRef idx="0">
+                <a:schemeClr val="accent1"/>
+              </a:effectRef>
+              <a:fontRef idx="minor">
+                <a:schemeClr val="tx1"/>
+              </a:fontRef>
+            </p:style>
+          </p:cxnSp>
+          <p:cxnSp>
+            <p:nvCxnSpPr>
+              <p:cNvPr id="72" name="Straight Arrow Connector 71"/>
+              <p:cNvCxnSpPr/>
+              <p:nvPr/>
+            </p:nvCxnSpPr>
+            <p:spPr>
+              <a:xfrm flipV="1">
+                <a:off x="2316162" y="548481"/>
+                <a:ext cx="0" cy="914400"/>
+              </a:xfrm>
+              <a:prstGeom prst="straightConnector1">
+                <a:avLst/>
+              </a:prstGeom>
+              <a:ln>
+                <a:solidFill>
+                  <a:srgbClr val="170CFA"/>
+                </a:solidFill>
+                <a:prstDash val="solid"/>
+                <a:tailEnd type="arrow"/>
+              </a:ln>
+            </p:spPr>
+            <p:style>
+              <a:lnRef idx="1">
+                <a:schemeClr val="accent1"/>
+              </a:lnRef>
+              <a:fillRef idx="0">
+                <a:schemeClr val="accent1"/>
+              </a:fillRef>
+              <a:effectRef idx="0">
+                <a:schemeClr val="accent1"/>
+              </a:effectRef>
+              <a:fontRef idx="minor">
+                <a:schemeClr val="tx1"/>
+              </a:fontRef>
+            </p:style>
+          </p:cxnSp>
+          <p:cxnSp>
+            <p:nvCxnSpPr>
+              <p:cNvPr id="73" name="Straight Arrow Connector 72"/>
+              <p:cNvCxnSpPr/>
+              <p:nvPr/>
+            </p:nvCxnSpPr>
+            <p:spPr>
+              <a:xfrm flipV="1">
+                <a:off x="2392362" y="390701"/>
+                <a:ext cx="0" cy="919780"/>
+              </a:xfrm>
+              <a:prstGeom prst="straightConnector1">
+                <a:avLst/>
+              </a:prstGeom>
+              <a:ln>
+                <a:solidFill>
+                  <a:srgbClr val="FF0000"/>
+                </a:solidFill>
+                <a:tailEnd type="arrow"/>
+              </a:ln>
+            </p:spPr>
+            <p:style>
+              <a:lnRef idx="1">
+                <a:schemeClr val="accent1"/>
+              </a:lnRef>
+              <a:fillRef idx="0">
+                <a:schemeClr val="accent1"/>
+              </a:fillRef>
+              <a:effectRef idx="0">
+                <a:schemeClr val="accent1"/>
+              </a:effectRef>
+              <a:fontRef idx="minor">
+                <a:schemeClr val="tx1"/>
+              </a:fontRef>
+            </p:style>
+          </p:cxnSp>
+          <p:cxnSp>
+            <p:nvCxnSpPr>
+              <p:cNvPr id="74" name="Straight Arrow Connector 73"/>
+              <p:cNvCxnSpPr/>
+              <p:nvPr/>
+            </p:nvCxnSpPr>
+            <p:spPr>
+              <a:xfrm flipV="1">
+                <a:off x="2620962" y="1310481"/>
+                <a:ext cx="0" cy="152400"/>
+              </a:xfrm>
+              <a:prstGeom prst="straightConnector1">
+                <a:avLst/>
+              </a:prstGeom>
+              <a:ln>
+                <a:solidFill>
+                  <a:srgbClr val="170CFA"/>
+                </a:solidFill>
+                <a:prstDash val="sysDash"/>
+                <a:tailEnd type="arrow"/>
+              </a:ln>
+            </p:spPr>
+            <p:style>
+              <a:lnRef idx="1">
+                <a:schemeClr val="accent1"/>
+              </a:lnRef>
+              <a:fillRef idx="0">
+                <a:schemeClr val="accent1"/>
+              </a:fillRef>
+              <a:effectRef idx="0">
+                <a:schemeClr val="accent1"/>
+              </a:effectRef>
+              <a:fontRef idx="minor">
+                <a:schemeClr val="tx1"/>
+              </a:fontRef>
+            </p:style>
+          </p:cxnSp>
+          <p:cxnSp>
+            <p:nvCxnSpPr>
+              <p:cNvPr id="75" name="Straight Arrow Connector 74"/>
+              <p:cNvCxnSpPr/>
+              <p:nvPr/>
+            </p:nvCxnSpPr>
+            <p:spPr>
+              <a:xfrm flipV="1">
+                <a:off x="2620962" y="396081"/>
+                <a:ext cx="0" cy="152400"/>
+              </a:xfrm>
+              <a:prstGeom prst="straightConnector1">
+                <a:avLst/>
+              </a:prstGeom>
+              <a:ln>
+                <a:solidFill>
+                  <a:srgbClr val="FF0000"/>
+                </a:solidFill>
+                <a:prstDash val="sysDash"/>
+                <a:tailEnd type="arrow"/>
+              </a:ln>
+            </p:spPr>
+            <p:style>
+              <a:lnRef idx="1">
+                <a:schemeClr val="accent1"/>
+              </a:lnRef>
+              <a:fillRef idx="0">
+                <a:schemeClr val="accent1"/>
+              </a:fillRef>
+              <a:effectRef idx="0">
+                <a:schemeClr val="accent1"/>
+              </a:effectRef>
+              <a:fontRef idx="minor">
+                <a:schemeClr val="tx1"/>
+              </a:fontRef>
+            </p:style>
+          </p:cxnSp>
+          <p:sp>
+            <p:nvSpPr>
+              <p:cNvPr id="76" name="TextBox 75"/>
+              <p:cNvSpPr txBox="1"/>
+              <p:nvPr/>
+            </p:nvSpPr>
+            <p:spPr>
+              <a:xfrm>
+                <a:off x="1513514" y="-44933"/>
+                <a:ext cx="292068" cy="246220"/>
+              </a:xfrm>
+              <a:prstGeom prst="rect">
+                <a:avLst/>
+              </a:prstGeom>
+              <a:noFill/>
+            </p:spPr>
+            <p:txBody>
+              <a:bodyPr wrap="none" rtlCol="0">
+                <a:spAutoFit/>
+              </a:bodyPr>
+              <a:lstStyle/>
+              <a:p>
+                <a:r>
+                  <a:rPr lang="en-US" sz="1000" dirty="0" smtClean="0"/>
+                  <a:t>E</a:t>
+                </a:r>
+                <a:r>
+                  <a:rPr lang="en-US" sz="1000" baseline="-25000" dirty="0" smtClean="0"/>
+                  <a:t>n</a:t>
+                </a:r>
+                <a:endParaRPr lang="en-US" sz="1000" dirty="0"/>
+              </a:p>
+            </p:txBody>
+          </p:sp>
+          <p:sp>
+            <p:nvSpPr>
+              <p:cNvPr id="77" name="TextBox 76"/>
+              <p:cNvSpPr txBox="1"/>
+              <p:nvPr/>
+            </p:nvSpPr>
+            <p:spPr>
+              <a:xfrm>
+                <a:off x="2697162" y="813336"/>
+                <a:ext cx="381836" cy="246221"/>
+              </a:xfrm>
+              <a:prstGeom prst="rect">
+                <a:avLst/>
+              </a:prstGeom>
+              <a:noFill/>
+            </p:spPr>
+            <p:txBody>
+              <a:bodyPr wrap="none" rtlCol="0">
+                <a:spAutoFit/>
+              </a:bodyPr>
+              <a:lstStyle/>
+              <a:p>
+                <a:r>
+                  <a:rPr lang="en-US" sz="1000" dirty="0" smtClean="0"/>
+                  <a:t>n=0</a:t>
+                </a:r>
+                <a:endParaRPr lang="en-US" sz="1000" dirty="0"/>
+              </a:p>
+            </p:txBody>
+          </p:sp>
+          <p:sp>
+            <p:nvSpPr>
+              <p:cNvPr id="78" name="TextBox 77"/>
+              <p:cNvSpPr txBox="1"/>
+              <p:nvPr/>
+            </p:nvSpPr>
+            <p:spPr>
+              <a:xfrm>
+                <a:off x="2697162" y="448453"/>
+                <a:ext cx="360996" cy="230832"/>
+              </a:xfrm>
+              <a:prstGeom prst="rect">
+                <a:avLst/>
+              </a:prstGeom>
+              <a:noFill/>
+            </p:spPr>
+            <p:txBody>
+              <a:bodyPr wrap="none" rtlCol="0">
+                <a:spAutoFit/>
+              </a:bodyPr>
+              <a:lstStyle/>
+              <a:p>
+                <a:r>
+                  <a:rPr lang="en-US" sz="900" dirty="0" smtClean="0"/>
+                  <a:t>n=1</a:t>
+                </a:r>
+                <a:endParaRPr lang="en-US" sz="900" dirty="0"/>
+              </a:p>
+            </p:txBody>
+          </p:sp>
+          <p:sp>
+            <p:nvSpPr>
+              <p:cNvPr id="79" name="TextBox 78"/>
+              <p:cNvSpPr txBox="1"/>
+              <p:nvPr/>
+            </p:nvSpPr>
+            <p:spPr>
+              <a:xfrm>
+                <a:off x="2697162" y="280534"/>
+                <a:ext cx="360996" cy="230832"/>
+              </a:xfrm>
+              <a:prstGeom prst="rect">
+                <a:avLst/>
+              </a:prstGeom>
+              <a:noFill/>
+            </p:spPr>
+            <p:txBody>
+              <a:bodyPr wrap="none" rtlCol="0">
+                <a:spAutoFit/>
+              </a:bodyPr>
+              <a:lstStyle/>
+              <a:p>
+                <a:r>
+                  <a:rPr lang="en-US" sz="900" dirty="0" smtClean="0"/>
+                  <a:t>n=2</a:t>
+                </a:r>
+                <a:endParaRPr lang="en-US" sz="900" dirty="0"/>
+              </a:p>
+            </p:txBody>
+          </p:sp>
+          <p:sp>
+            <p:nvSpPr>
+              <p:cNvPr id="80" name="TextBox 79"/>
+              <p:cNvSpPr txBox="1"/>
+              <p:nvPr/>
+            </p:nvSpPr>
+            <p:spPr>
+              <a:xfrm>
+                <a:off x="2697162" y="1210178"/>
+                <a:ext cx="420308" cy="246221"/>
+              </a:xfrm>
+              <a:prstGeom prst="rect">
+                <a:avLst/>
+              </a:prstGeom>
+              <a:noFill/>
+            </p:spPr>
+            <p:txBody>
+              <a:bodyPr wrap="none" rtlCol="0">
+                <a:spAutoFit/>
+              </a:bodyPr>
+              <a:lstStyle/>
+              <a:p>
+                <a:r>
+                  <a:rPr lang="en-US" sz="1000" dirty="0" smtClean="0"/>
+                  <a:t>n=-1</a:t>
+                </a:r>
+                <a:endParaRPr lang="en-US" sz="1000" dirty="0"/>
+              </a:p>
+            </p:txBody>
+          </p:sp>
+          <p:sp>
+            <p:nvSpPr>
+              <p:cNvPr id="81" name="TextBox 80"/>
+              <p:cNvSpPr txBox="1"/>
+              <p:nvPr/>
+            </p:nvSpPr>
+            <p:spPr>
+              <a:xfrm>
+                <a:off x="2697162" y="1362853"/>
+                <a:ext cx="420308" cy="246221"/>
+              </a:xfrm>
+              <a:prstGeom prst="rect">
+                <a:avLst/>
+              </a:prstGeom>
+              <a:noFill/>
+            </p:spPr>
+            <p:txBody>
+              <a:bodyPr wrap="none" rtlCol="0">
+                <a:spAutoFit/>
+              </a:bodyPr>
+              <a:lstStyle/>
+              <a:p>
+                <a:r>
+                  <a:rPr lang="en-US" sz="1000" dirty="0" smtClean="0"/>
+                  <a:t>n=-2</a:t>
+                </a:r>
+                <a:endParaRPr lang="en-US" sz="1000" dirty="0"/>
+              </a:p>
+            </p:txBody>
+          </p:sp>
+          <mc:AlternateContent xmlns:mc="http://schemas.openxmlformats.org/markup-compatibility/2006" xmlns:a14="http://schemas.microsoft.com/office/drawing/2010/main">
+            <mc:Choice Requires="a14">
+              <p:sp>
+                <p:nvSpPr>
+                  <p:cNvPr id="82" name="TextBox 81"/>
+                  <p:cNvSpPr txBox="1"/>
+                  <p:nvPr/>
+                </p:nvSpPr>
+                <p:spPr>
+                  <a:xfrm>
+                    <a:off x="1940474" y="-159282"/>
+                    <a:ext cx="1119975" cy="352088"/>
+                  </a:xfrm>
+                  <a:prstGeom prst="rect">
+                    <a:avLst/>
+                  </a:prstGeom>
+                  <a:noFill/>
+                  <a:ln>
+                    <a:solidFill>
+                      <a:schemeClr val="tx1"/>
+                    </a:solidFill>
+                  </a:ln>
+                </p:spPr>
+                <p:txBody>
+                  <a:bodyPr wrap="square" rtlCol="0">
+                    <a:spAutoFit/>
+                  </a:bodyPr>
+                  <a:lstStyle/>
+                  <a:p>
+                    <a:pPr/>
+                    <a14:m>
+                      <m:oMathPara xmlns:m="http://schemas.openxmlformats.org/officeDocument/2006/math">
+                        <m:oMathParaPr>
+                          <m:jc m:val="centerGroup"/>
+                        </m:oMathParaPr>
+                        <m:oMath xmlns:m="http://schemas.openxmlformats.org/officeDocument/2006/math">
+                          <m:r>
+                            <m:rPr>
+                              <m:sty m:val="p"/>
+                            </m:rPr>
+                            <a:rPr lang="en-US" sz="800" b="0" i="0" smtClean="0">
+                              <a:latin typeface="Cambria Math"/>
+                            </a:rPr>
+                            <m:t>Δ</m:t>
+                          </m:r>
+                          <m:r>
+                            <a:rPr lang="en-US" sz="800" b="0" i="1" smtClean="0">
+                              <a:latin typeface="Cambria Math"/>
+                            </a:rPr>
+                            <m:t>𝑛</m:t>
+                          </m:r>
+                          <m:r>
+                            <a:rPr lang="en-US" sz="800" b="0" i="1" smtClean="0">
+                              <a:latin typeface="Cambria Math"/>
+                            </a:rPr>
+                            <m:t>=±1</m:t>
+                          </m:r>
+                        </m:oMath>
+                      </m:oMathPara>
+                    </a14:m>
+                    <a:endParaRPr lang="en-US" sz="800" b="0" dirty="0" smtClean="0"/>
+                  </a:p>
+                  <a:p>
+                    <a:pPr algn="ctr"/>
+                    <a:r>
+                      <a:rPr lang="en-US" sz="800" dirty="0" smtClean="0"/>
+                      <a:t>B=12.6T</a:t>
+                    </a:r>
+                    <a:endParaRPr lang="en-US" sz="800" dirty="0"/>
+                  </a:p>
+                </p:txBody>
+              </p:sp>
+            </mc:Choice>
+            <mc:Fallback xmlns="">
+              <p:sp>
+                <p:nvSpPr>
+                  <p:cNvPr id="46" name="TextBox 45"/>
+                  <p:cNvSpPr txBox="1">
+                    <a:spLocks noRot="1" noChangeAspect="1" noMove="1" noResize="1" noEditPoints="1" noAdjustHandles="1" noChangeArrowheads="1" noChangeShapeType="1" noTextEdit="1"/>
+                  </p:cNvSpPr>
+                  <p:nvPr/>
+                </p:nvSpPr>
+                <p:spPr>
+                  <a:xfrm>
+                    <a:off x="1940474" y="-159282"/>
+                    <a:ext cx="1119975" cy="352088"/>
+                  </a:xfrm>
+                  <a:prstGeom prst="rect">
+                    <a:avLst/>
+                  </a:prstGeom>
+                  <a:blipFill rotWithShape="1">
+                    <a:blip r:embed="rId4"/>
+                    <a:stretch>
+                      <a:fillRect b="-3448"/>
+                    </a:stretch>
+                  </a:blipFill>
+                  <a:ln>
+                    <a:solidFill>
+                      <a:schemeClr val="tx1"/>
+                    </a:solidFill>
+                  </a:ln>
+                </p:spPr>
+                <p:txBody>
+                  <a:bodyPr/>
+                  <a:lstStyle/>
+                  <a:p>
+                    <a:r>
+                      <a:rPr lang="en-US">
+                        <a:noFill/>
+                      </a:rPr>
+                      <a:t> </a:t>
+                    </a:r>
+                  </a:p>
+                </p:txBody>
+              </p:sp>
+            </mc:Fallback>
+          </mc:AlternateContent>
+        </p:grpSp>
+        <p:grpSp>
+          <p:nvGrpSpPr>
+            <p:cNvPr id="2" name="Group 1"/>
+            <p:cNvGrpSpPr/>
+            <p:nvPr/>
+          </p:nvGrpSpPr>
+          <p:grpSpPr>
+            <a:xfrm>
+              <a:off x="2522587" y="2279359"/>
+              <a:ext cx="581527" cy="259693"/>
+              <a:chOff x="1890410" y="2279359"/>
+              <a:chExt cx="1019793" cy="259693"/>
+            </a:xfrm>
+          </p:grpSpPr>
+          <p:sp>
+            <p:nvSpPr>
+              <p:cNvPr id="83" name="TextBox 82"/>
+              <p:cNvSpPr txBox="1"/>
+              <p:nvPr/>
+            </p:nvSpPr>
+            <p:spPr>
+              <a:xfrm>
+                <a:off x="1890410" y="2279359"/>
+                <a:ext cx="290464" cy="246221"/>
+              </a:xfrm>
+              <a:prstGeom prst="rect">
+                <a:avLst/>
+              </a:prstGeom>
+              <a:noFill/>
+            </p:spPr>
+            <p:txBody>
+              <a:bodyPr wrap="none" rtlCol="0">
+                <a:spAutoFit/>
+              </a:bodyPr>
+              <a:lstStyle/>
+              <a:p>
+                <a:r>
+                  <a:rPr lang="en-US" sz="1000" dirty="0" smtClean="0"/>
+                  <a:t>T</a:t>
+                </a:r>
+                <a:r>
+                  <a:rPr lang="en-US" sz="1000" baseline="-25000" dirty="0" smtClean="0"/>
+                  <a:t>0</a:t>
+                </a:r>
+                <a:endParaRPr lang="en-US" sz="1000" dirty="0"/>
+              </a:p>
+            </p:txBody>
+          </p:sp>
+          <p:sp>
+            <p:nvSpPr>
+              <p:cNvPr id="84" name="TextBox 83"/>
+              <p:cNvSpPr txBox="1"/>
+              <p:nvPr/>
+            </p:nvSpPr>
+            <p:spPr>
+              <a:xfrm>
+                <a:off x="2264866" y="2285621"/>
+                <a:ext cx="290464" cy="246221"/>
+              </a:xfrm>
+              <a:prstGeom prst="rect">
+                <a:avLst/>
+              </a:prstGeom>
+              <a:noFill/>
+            </p:spPr>
+            <p:txBody>
+              <a:bodyPr wrap="none" rtlCol="0">
+                <a:spAutoFit/>
+              </a:bodyPr>
+              <a:lstStyle/>
+              <a:p>
+                <a:r>
+                  <a:rPr lang="en-US" sz="1000" dirty="0" smtClean="0"/>
+                  <a:t>T</a:t>
+                </a:r>
+                <a:r>
+                  <a:rPr lang="en-US" sz="1000" baseline="-25000" dirty="0"/>
+                  <a:t>1</a:t>
+                </a:r>
+                <a:endParaRPr lang="en-US" sz="1000" dirty="0"/>
+              </a:p>
+            </p:txBody>
+          </p:sp>
+          <p:sp>
+            <p:nvSpPr>
+              <p:cNvPr id="85" name="TextBox 84"/>
+              <p:cNvSpPr txBox="1"/>
+              <p:nvPr/>
+            </p:nvSpPr>
+            <p:spPr>
+              <a:xfrm>
+                <a:off x="2622945" y="2292831"/>
+                <a:ext cx="287258" cy="246221"/>
+              </a:xfrm>
+              <a:prstGeom prst="rect">
+                <a:avLst/>
+              </a:prstGeom>
+              <a:noFill/>
+            </p:spPr>
+            <p:txBody>
+              <a:bodyPr wrap="none" rtlCol="0">
+                <a:spAutoFit/>
+              </a:bodyPr>
+              <a:lstStyle/>
+              <a:p>
+                <a:r>
+                  <a:rPr lang="en-US" sz="1000" dirty="0" smtClean="0"/>
+                  <a:t>S</a:t>
+                </a:r>
+                <a:r>
+                  <a:rPr lang="en-US" sz="1000" baseline="-25000" dirty="0" smtClean="0"/>
+                  <a:t>1</a:t>
+                </a:r>
+                <a:endParaRPr lang="en-US" sz="1000" dirty="0"/>
+              </a:p>
+            </p:txBody>
+          </p:sp>
+        </p:grpSp>
+      </p:grpSp>
+      <p:sp>
+        <p:nvSpPr>
+          <p:cNvPr id="86" name="TextBox 85"/>
+          <p:cNvSpPr txBox="1"/>
+          <p:nvPr/>
+        </p:nvSpPr>
+        <p:spPr>
+          <a:xfrm>
+            <a:off x="67529" y="-18810"/>
+            <a:ext cx="284052" cy="246221"/>
+          </a:xfrm>
+          <a:prstGeom prst="rect">
+            <a:avLst/>
+          </a:prstGeom>
+          <a:noFill/>
+        </p:spPr>
+        <p:txBody>
+          <a:bodyPr wrap="none" rtlCol="0">
+            <a:spAutoFit/>
+          </a:bodyPr>
+          <a:lstStyle/>
+          <a:p>
+            <a:r>
+              <a:rPr lang="en-US" sz="1000" dirty="0" smtClean="0"/>
+              <a:t>a)</a:t>
+            </a:r>
+            <a:endParaRPr lang="en-US" sz="1000" dirty="0"/>
+          </a:p>
+        </p:txBody>
+      </p:sp>
+      <p:sp>
+        <p:nvSpPr>
+          <p:cNvPr id="87" name="TextBox 86"/>
+          <p:cNvSpPr txBox="1"/>
+          <p:nvPr/>
+        </p:nvSpPr>
+        <p:spPr>
+          <a:xfrm>
+            <a:off x="1143000" y="-18811"/>
+            <a:ext cx="290464" cy="246221"/>
+          </a:xfrm>
+          <a:prstGeom prst="rect">
+            <a:avLst/>
+          </a:prstGeom>
+          <a:noFill/>
+        </p:spPr>
+        <p:txBody>
+          <a:bodyPr wrap="none" rtlCol="0">
+            <a:spAutoFit/>
+          </a:bodyPr>
+          <a:lstStyle/>
+          <a:p>
+            <a:r>
+              <a:rPr lang="en-US" sz="1000" dirty="0"/>
+              <a:t>b</a:t>
+            </a:r>
+            <a:r>
+              <a:rPr lang="en-US" sz="1000" dirty="0" smtClean="0"/>
+              <a:t>)</a:t>
+            </a:r>
+            <a:endParaRPr lang="en-US" sz="1000" dirty="0"/>
+          </a:p>
+        </p:txBody>
+      </p:sp>
+      <p:sp>
+        <p:nvSpPr>
+          <p:cNvPr id="88" name="TextBox 87"/>
+          <p:cNvSpPr txBox="1"/>
+          <p:nvPr/>
+        </p:nvSpPr>
+        <p:spPr>
+          <a:xfrm>
+            <a:off x="3505200" y="-18809"/>
+            <a:ext cx="277640" cy="246221"/>
+          </a:xfrm>
+          <a:prstGeom prst="rect">
+            <a:avLst/>
+          </a:prstGeom>
+          <a:noFill/>
+        </p:spPr>
+        <p:txBody>
+          <a:bodyPr wrap="none" rtlCol="0">
+            <a:spAutoFit/>
+          </a:bodyPr>
+          <a:lstStyle/>
+          <a:p>
+            <a:r>
+              <a:rPr lang="en-US" sz="1000" dirty="0" smtClean="0"/>
+              <a:t>c)</a:t>
+            </a:r>
+            <a:endParaRPr lang="en-US" sz="1000" dirty="0"/>
+          </a:p>
+        </p:txBody>
+      </p:sp>
       <p:pic>
         <p:nvPicPr>
-          <p:cNvPr id="1032" name="Picture 8" descr="C:\Users\Owner\research\graphene\graphene_hf\results\2009_MagnetoPhonons_121\MagnetoPhonon-Fitting\GateVoltageTuning-POSITION.png"/>
+          <p:cNvPr id="1031" name="Picture 7" descr="C:\Users\Owner\research\graphene\graphene_hf\results\2009_MagnetoPhonons_121\FillingFactor-Dependence\fig6.png"/>
           <p:cNvPicPr>
             <a:picLocks noChangeAspect="1" noChangeArrowheads="1"/>
           </p:cNvPicPr>
           <p:nvPr/>
         </p:nvPicPr>
         <p:blipFill>
-          <a:blip r:embed="rId2" cstate="print">
+          <a:blip r:embed="rId5" cstate="print">
             <a:extLst>
               <a:ext uri="{28A0092B-C50C-407E-A947-70E740481C1C}">
                 <a14:useLocalDpi xmlns:a14="http://schemas.microsoft.com/office/drawing/2010/main" val="0"/>
@@ -3118,8 +4092,8 @@
         </p:blipFill>
         <p:spPr bwMode="auto">
           <a:xfrm>
-            <a:off x="3429000" y="0"/>
-            <a:ext cx="3108325" cy="2743200"/>
+            <a:off x="1265945" y="210839"/>
+            <a:ext cx="2378075" cy="2286000"/>
           </a:xfrm>
           <a:prstGeom prst="rect">
             <a:avLst/>
@@ -3136,16 +4110,246 @@
           </a:extLst>
         </p:spPr>
       </p:pic>
+      <p:sp>
+        <p:nvSpPr>
+          <p:cNvPr id="6" name="TextBox 5"/>
+          <p:cNvSpPr txBox="1"/>
+          <p:nvPr/>
+        </p:nvSpPr>
+        <p:spPr>
+          <a:xfrm>
+            <a:off x="2473690" y="450522"/>
+            <a:ext cx="421910" cy="215444"/>
+          </a:xfrm>
+          <a:prstGeom prst="rect">
+            <a:avLst/>
+          </a:prstGeom>
+          <a:noFill/>
+        </p:spPr>
+        <p:txBody>
+          <a:bodyPr wrap="none" rtlCol="0">
+            <a:spAutoFit/>
+          </a:bodyPr>
+          <a:lstStyle/>
+          <a:p>
+            <a:r>
+              <a:rPr lang="en-US" sz="800" dirty="0" smtClean="0"/>
+              <a:t>(T</a:t>
+            </a:r>
+            <a:r>
+              <a:rPr lang="en-US" sz="800" baseline="-25000" dirty="0" smtClean="0"/>
+              <a:t>1</a:t>
+            </a:r>
+            <a:r>
+              <a:rPr lang="en-US" sz="800" dirty="0" smtClean="0"/>
+              <a:t>,f</a:t>
+            </a:r>
+            <a:r>
+              <a:rPr lang="en-US" sz="800" baseline="52000" dirty="0" smtClean="0"/>
+              <a:t>+</a:t>
+            </a:r>
+            <a:r>
+              <a:rPr lang="en-US" sz="800" dirty="0" smtClean="0"/>
+              <a:t>)</a:t>
+            </a:r>
+            <a:endParaRPr lang="en-US" sz="800" dirty="0"/>
+          </a:p>
+        </p:txBody>
+      </p:sp>
+      <p:sp>
+        <p:nvSpPr>
+          <p:cNvPr id="40" name="TextBox 39"/>
+          <p:cNvSpPr txBox="1"/>
+          <p:nvPr/>
+        </p:nvSpPr>
+        <p:spPr>
+          <a:xfrm>
+            <a:off x="2743200" y="1828800"/>
+            <a:ext cx="421910" cy="215444"/>
+          </a:xfrm>
+          <a:prstGeom prst="rect">
+            <a:avLst/>
+          </a:prstGeom>
+          <a:noFill/>
+        </p:spPr>
+        <p:txBody>
+          <a:bodyPr wrap="none" rtlCol="0">
+            <a:spAutoFit/>
+          </a:bodyPr>
+          <a:lstStyle/>
+          <a:p>
+            <a:r>
+              <a:rPr lang="en-US" sz="800" dirty="0" smtClean="0"/>
+              <a:t>(T</a:t>
+            </a:r>
+            <a:r>
+              <a:rPr lang="en-US" sz="800" baseline="-25000" dirty="0"/>
+              <a:t>2</a:t>
+            </a:r>
+            <a:r>
+              <a:rPr lang="en-US" sz="800" dirty="0" smtClean="0"/>
+              <a:t>,f</a:t>
+            </a:r>
+            <a:r>
+              <a:rPr lang="en-US" sz="800" baseline="52000" dirty="0" smtClean="0"/>
+              <a:t>+</a:t>
+            </a:r>
+            <a:r>
+              <a:rPr lang="en-US" sz="800" dirty="0" smtClean="0"/>
+              <a:t>)</a:t>
+            </a:r>
+            <a:endParaRPr lang="en-US" sz="800" dirty="0"/>
+          </a:p>
+        </p:txBody>
+      </p:sp>
+      <p:sp>
+        <p:nvSpPr>
+          <p:cNvPr id="41" name="TextBox 40"/>
+          <p:cNvSpPr txBox="1"/>
+          <p:nvPr/>
+        </p:nvSpPr>
+        <p:spPr>
+          <a:xfrm>
+            <a:off x="3048000" y="1746995"/>
+            <a:ext cx="421910" cy="215444"/>
+          </a:xfrm>
+          <a:prstGeom prst="rect">
+            <a:avLst/>
+          </a:prstGeom>
+          <a:noFill/>
+        </p:spPr>
+        <p:txBody>
+          <a:bodyPr wrap="none" rtlCol="0">
+            <a:spAutoFit/>
+          </a:bodyPr>
+          <a:lstStyle/>
+          <a:p>
+            <a:r>
+              <a:rPr lang="en-US" sz="800" dirty="0" smtClean="0"/>
+              <a:t>(T</a:t>
+            </a:r>
+            <a:r>
+              <a:rPr lang="en-US" sz="800" baseline="-25000" dirty="0"/>
+              <a:t>3</a:t>
+            </a:r>
+            <a:r>
+              <a:rPr lang="en-US" sz="800" dirty="0" smtClean="0"/>
+              <a:t>,f</a:t>
+            </a:r>
+            <a:r>
+              <a:rPr lang="en-US" sz="800" baseline="52000" dirty="0" smtClean="0"/>
+              <a:t>+</a:t>
+            </a:r>
+            <a:r>
+              <a:rPr lang="en-US" sz="800" dirty="0" smtClean="0"/>
+              <a:t>)</a:t>
+            </a:r>
+            <a:endParaRPr lang="en-US" sz="800" dirty="0"/>
+          </a:p>
+        </p:txBody>
+      </p:sp>
+      <p:sp>
+        <p:nvSpPr>
+          <p:cNvPr id="42" name="TextBox 41"/>
+          <p:cNvSpPr txBox="1"/>
+          <p:nvPr/>
+        </p:nvSpPr>
+        <p:spPr>
+          <a:xfrm>
+            <a:off x="2684645" y="1246117"/>
+            <a:ext cx="418704" cy="215444"/>
+          </a:xfrm>
+          <a:prstGeom prst="rect">
+            <a:avLst/>
+          </a:prstGeom>
+          <a:noFill/>
+        </p:spPr>
+        <p:txBody>
+          <a:bodyPr wrap="none" rtlCol="0">
+            <a:spAutoFit/>
+          </a:bodyPr>
+          <a:lstStyle/>
+          <a:p>
+            <a:r>
+              <a:rPr lang="en-US" sz="800" dirty="0" smtClean="0"/>
+              <a:t>(S</a:t>
+            </a:r>
+            <a:r>
+              <a:rPr lang="en-US" sz="800" baseline="-25000" dirty="0" smtClean="0"/>
+              <a:t>1</a:t>
+            </a:r>
+            <a:r>
+              <a:rPr lang="en-US" sz="800" dirty="0" smtClean="0"/>
+              <a:t>,f</a:t>
+            </a:r>
+            <a:r>
+              <a:rPr lang="en-US" sz="800" baseline="52000" dirty="0" smtClean="0"/>
+              <a:t>+</a:t>
+            </a:r>
+            <a:r>
+              <a:rPr lang="en-US" sz="800" dirty="0" smtClean="0"/>
+              <a:t>)</a:t>
+            </a:r>
+            <a:endParaRPr lang="en-US" sz="800" dirty="0"/>
+          </a:p>
+        </p:txBody>
+      </p:sp>
+      <p:sp>
+        <p:nvSpPr>
+          <p:cNvPr id="43" name="TextBox 42"/>
+          <p:cNvSpPr txBox="1"/>
+          <p:nvPr/>
+        </p:nvSpPr>
+        <p:spPr>
+          <a:xfrm>
+            <a:off x="3048000" y="1296237"/>
+            <a:ext cx="418704" cy="215444"/>
+          </a:xfrm>
+          <a:prstGeom prst="rect">
+            <a:avLst/>
+          </a:prstGeom>
+          <a:noFill/>
+        </p:spPr>
+        <p:txBody>
+          <a:bodyPr wrap="none" rtlCol="0">
+            <a:spAutoFit/>
+          </a:bodyPr>
+          <a:lstStyle/>
+          <a:p>
+            <a:r>
+              <a:rPr lang="en-US" sz="800" dirty="0" smtClean="0"/>
+              <a:t>(S</a:t>
+            </a:r>
+            <a:r>
+              <a:rPr lang="en-US" sz="800" baseline="-25000" dirty="0"/>
+              <a:t>2</a:t>
+            </a:r>
+            <a:r>
+              <a:rPr lang="en-US" sz="800" dirty="0" smtClean="0"/>
+              <a:t>,f</a:t>
+            </a:r>
+            <a:r>
+              <a:rPr lang="en-US" sz="800" baseline="52000" dirty="0" smtClean="0"/>
+              <a:t>+</a:t>
+            </a:r>
+            <a:r>
+              <a:rPr lang="en-US" sz="800" dirty="0" smtClean="0"/>
+              <a:t>)</a:t>
+            </a:r>
+            <a:endParaRPr lang="en-US" sz="800" dirty="0"/>
+          </a:p>
+        </p:txBody>
+      </p:sp>
       <p:pic>
         <p:nvPicPr>
-          <p:cNvPr id="1029" name="Picture 5" descr="C:\Users\Owner\research\graphene\graphene_hf\results\2009_MagnetoPhonons_121\temp\fig6.png"/>
+          <p:cNvPr id="1026" name="Picture 2" descr="C:\Users\Owner\Dropbox\Git\MagnetoPhonons\images\GateVoltageTuning-POSITION-NO-Symmetric-transitions.png"/>
           <p:cNvPicPr>
             <a:picLocks noChangeAspect="1" noChangeArrowheads="1"/>
           </p:cNvPicPr>
           <p:nvPr/>
         </p:nvPicPr>
         <p:blipFill>
-          <a:blip r:embed="rId3" cstate="print">
+          <a:blip r:embed="rId6" cstate="print">
             <a:extLst>
               <a:ext uri="{28A0092B-C50C-407E-A947-70E740481C1C}">
                 <a14:useLocalDpi xmlns:a14="http://schemas.microsoft.com/office/drawing/2010/main" val="0"/>
@@ -3159,8 +4363,8 @@
         </p:blipFill>
         <p:spPr bwMode="auto">
           <a:xfrm>
-            <a:off x="0" y="0"/>
-            <a:ext cx="2560638" cy="2743200"/>
+            <a:off x="3590925" y="210839"/>
+            <a:ext cx="2743200" cy="2286000"/>
           </a:xfrm>
           <a:prstGeom prst="rect">
             <a:avLst/>
@@ -3177,964 +4381,6 @@
           </a:extLst>
         </p:spPr>
       </p:pic>
-      <p:grpSp>
-        <p:nvGrpSpPr>
-          <p:cNvPr id="63" name="Group 62"/>
-          <p:cNvGrpSpPr/>
-          <p:nvPr/>
-        </p:nvGrpSpPr>
-        <p:grpSpPr>
-          <a:xfrm>
-            <a:off x="2438400" y="182188"/>
-            <a:ext cx="992263" cy="2331575"/>
-            <a:chOff x="1513514" y="-159282"/>
-            <a:chExt cx="1603956" cy="1818530"/>
-          </a:xfrm>
-        </p:grpSpPr>
-        <p:cxnSp>
-          <p:nvCxnSpPr>
-            <p:cNvPr id="64" name="Straight Arrow Connector 63"/>
-            <p:cNvCxnSpPr/>
-            <p:nvPr/>
-          </p:nvCxnSpPr>
-          <p:spPr>
-            <a:xfrm flipV="1">
-              <a:off x="1782762" y="167481"/>
-              <a:ext cx="0" cy="1491767"/>
-            </a:xfrm>
-            <a:prstGeom prst="straightConnector1">
-              <a:avLst/>
-            </a:prstGeom>
-            <a:ln>
-              <a:solidFill>
-                <a:schemeClr val="tx1"/>
-              </a:solidFill>
-              <a:tailEnd type="arrow"/>
-            </a:ln>
-          </p:spPr>
-          <p:style>
-            <a:lnRef idx="1">
-              <a:schemeClr val="accent1"/>
-            </a:lnRef>
-            <a:fillRef idx="0">
-              <a:schemeClr val="accent1"/>
-            </a:fillRef>
-            <a:effectRef idx="0">
-              <a:schemeClr val="accent1"/>
-            </a:effectRef>
-            <a:fontRef idx="minor">
-              <a:schemeClr val="tx1"/>
-            </a:fontRef>
-          </p:style>
-        </p:cxnSp>
-        <p:cxnSp>
-          <p:nvCxnSpPr>
-            <p:cNvPr id="65" name="Straight Connector 64"/>
-            <p:cNvCxnSpPr/>
-            <p:nvPr/>
-          </p:nvCxnSpPr>
-          <p:spPr>
-            <a:xfrm flipV="1">
-              <a:off x="1858962" y="924590"/>
-              <a:ext cx="914400" cy="4892"/>
-            </a:xfrm>
-            <a:prstGeom prst="line">
-              <a:avLst/>
-            </a:prstGeom>
-            <a:ln w="19050">
-              <a:solidFill>
-                <a:srgbClr val="FFC000"/>
-              </a:solidFill>
-            </a:ln>
-          </p:spPr>
-          <p:style>
-            <a:lnRef idx="1">
-              <a:schemeClr val="accent1"/>
-            </a:lnRef>
-            <a:fillRef idx="0">
-              <a:schemeClr val="accent1"/>
-            </a:fillRef>
-            <a:effectRef idx="0">
-              <a:schemeClr val="accent1"/>
-            </a:effectRef>
-            <a:fontRef idx="minor">
-              <a:schemeClr val="tx1"/>
-            </a:fontRef>
-          </p:style>
-        </p:cxnSp>
-        <p:cxnSp>
-          <p:nvCxnSpPr>
-            <p:cNvPr id="66" name="Straight Connector 65"/>
-            <p:cNvCxnSpPr/>
-            <p:nvPr/>
-          </p:nvCxnSpPr>
-          <p:spPr>
-            <a:xfrm>
-              <a:off x="1858962" y="1310481"/>
-              <a:ext cx="914400" cy="0"/>
-            </a:xfrm>
-            <a:prstGeom prst="line">
-              <a:avLst/>
-            </a:prstGeom>
-            <a:ln w="19050">
-              <a:solidFill>
-                <a:srgbClr val="FFC000"/>
-              </a:solidFill>
-            </a:ln>
-          </p:spPr>
-          <p:style>
-            <a:lnRef idx="1">
-              <a:schemeClr val="accent1"/>
-            </a:lnRef>
-            <a:fillRef idx="0">
-              <a:schemeClr val="accent1"/>
-            </a:fillRef>
-            <a:effectRef idx="0">
-              <a:schemeClr val="accent1"/>
-            </a:effectRef>
-            <a:fontRef idx="minor">
-              <a:schemeClr val="tx1"/>
-            </a:fontRef>
-          </p:style>
-        </p:cxnSp>
-        <p:cxnSp>
-          <p:nvCxnSpPr>
-            <p:cNvPr id="67" name="Straight Connector 66"/>
-            <p:cNvCxnSpPr/>
-            <p:nvPr/>
-          </p:nvCxnSpPr>
-          <p:spPr>
-            <a:xfrm>
-              <a:off x="1858962" y="548481"/>
-              <a:ext cx="914400" cy="0"/>
-            </a:xfrm>
-            <a:prstGeom prst="line">
-              <a:avLst/>
-            </a:prstGeom>
-            <a:ln w="19050">
-              <a:solidFill>
-                <a:schemeClr val="tx1"/>
-              </a:solidFill>
-            </a:ln>
-          </p:spPr>
-          <p:style>
-            <a:lnRef idx="1">
-              <a:schemeClr val="accent1"/>
-            </a:lnRef>
-            <a:fillRef idx="0">
-              <a:schemeClr val="accent1"/>
-            </a:fillRef>
-            <a:effectRef idx="0">
-              <a:schemeClr val="accent1"/>
-            </a:effectRef>
-            <a:fontRef idx="minor">
-              <a:schemeClr val="tx1"/>
-            </a:fontRef>
-          </p:style>
-        </p:cxnSp>
-        <p:cxnSp>
-          <p:nvCxnSpPr>
-            <p:cNvPr id="68" name="Straight Connector 67"/>
-            <p:cNvCxnSpPr/>
-            <p:nvPr/>
-          </p:nvCxnSpPr>
-          <p:spPr>
-            <a:xfrm>
-              <a:off x="1858962" y="396081"/>
-              <a:ext cx="914400" cy="0"/>
-            </a:xfrm>
-            <a:prstGeom prst="line">
-              <a:avLst/>
-            </a:prstGeom>
-            <a:ln w="19050">
-              <a:solidFill>
-                <a:schemeClr val="tx1"/>
-              </a:solidFill>
-            </a:ln>
-          </p:spPr>
-          <p:style>
-            <a:lnRef idx="1">
-              <a:schemeClr val="accent1"/>
-            </a:lnRef>
-            <a:fillRef idx="0">
-              <a:schemeClr val="accent1"/>
-            </a:fillRef>
-            <a:effectRef idx="0">
-              <a:schemeClr val="accent1"/>
-            </a:effectRef>
-            <a:fontRef idx="minor">
-              <a:schemeClr val="tx1"/>
-            </a:fontRef>
-          </p:style>
-        </p:cxnSp>
-        <p:cxnSp>
-          <p:nvCxnSpPr>
-            <p:cNvPr id="69" name="Straight Connector 68"/>
-            <p:cNvCxnSpPr/>
-            <p:nvPr/>
-          </p:nvCxnSpPr>
-          <p:spPr>
-            <a:xfrm>
-              <a:off x="1858962" y="1462881"/>
-              <a:ext cx="914400" cy="0"/>
-            </a:xfrm>
-            <a:prstGeom prst="line">
-              <a:avLst/>
-            </a:prstGeom>
-            <a:ln w="19050">
-              <a:solidFill>
-                <a:srgbClr val="FFC000"/>
-              </a:solidFill>
-            </a:ln>
-          </p:spPr>
-          <p:style>
-            <a:lnRef idx="1">
-              <a:schemeClr val="accent1"/>
-            </a:lnRef>
-            <a:fillRef idx="0">
-              <a:schemeClr val="accent1"/>
-            </a:fillRef>
-            <a:effectRef idx="0">
-              <a:schemeClr val="accent1"/>
-            </a:effectRef>
-            <a:fontRef idx="minor">
-              <a:schemeClr val="tx1"/>
-            </a:fontRef>
-          </p:style>
-        </p:cxnSp>
-        <p:cxnSp>
-          <p:nvCxnSpPr>
-            <p:cNvPr id="70" name="Straight Arrow Connector 69"/>
-            <p:cNvCxnSpPr/>
-            <p:nvPr/>
-          </p:nvCxnSpPr>
-          <p:spPr>
-            <a:xfrm flipV="1">
-              <a:off x="1935162" y="548481"/>
-              <a:ext cx="0" cy="381000"/>
-            </a:xfrm>
-            <a:prstGeom prst="straightConnector1">
-              <a:avLst/>
-            </a:prstGeom>
-            <a:ln>
-              <a:solidFill>
-                <a:srgbClr val="FF0000"/>
-              </a:solidFill>
-              <a:prstDash val="solid"/>
-              <a:tailEnd type="arrow"/>
-            </a:ln>
-          </p:spPr>
-          <p:style>
-            <a:lnRef idx="1">
-              <a:schemeClr val="accent1"/>
-            </a:lnRef>
-            <a:fillRef idx="0">
-              <a:schemeClr val="accent1"/>
-            </a:fillRef>
-            <a:effectRef idx="0">
-              <a:schemeClr val="accent1"/>
-            </a:effectRef>
-            <a:fontRef idx="minor">
-              <a:schemeClr val="tx1"/>
-            </a:fontRef>
-          </p:style>
-        </p:cxnSp>
-        <p:cxnSp>
-          <p:nvCxnSpPr>
-            <p:cNvPr id="71" name="Straight Arrow Connector 70"/>
-            <p:cNvCxnSpPr/>
-            <p:nvPr/>
-          </p:nvCxnSpPr>
-          <p:spPr>
-            <a:xfrm flipV="1">
-              <a:off x="1935162" y="929481"/>
-              <a:ext cx="0" cy="381000"/>
-            </a:xfrm>
-            <a:prstGeom prst="straightConnector1">
-              <a:avLst/>
-            </a:prstGeom>
-            <a:ln>
-              <a:solidFill>
-                <a:srgbClr val="170CFA"/>
-              </a:solidFill>
-              <a:prstDash val="sysDash"/>
-              <a:tailEnd type="arrow"/>
-            </a:ln>
-          </p:spPr>
-          <p:style>
-            <a:lnRef idx="1">
-              <a:schemeClr val="accent1"/>
-            </a:lnRef>
-            <a:fillRef idx="0">
-              <a:schemeClr val="accent1"/>
-            </a:fillRef>
-            <a:effectRef idx="0">
-              <a:schemeClr val="accent1"/>
-            </a:effectRef>
-            <a:fontRef idx="minor">
-              <a:schemeClr val="tx1"/>
-            </a:fontRef>
-          </p:style>
-        </p:cxnSp>
-        <p:cxnSp>
-          <p:nvCxnSpPr>
-            <p:cNvPr id="72" name="Straight Arrow Connector 71"/>
-            <p:cNvCxnSpPr/>
-            <p:nvPr/>
-          </p:nvCxnSpPr>
-          <p:spPr>
-            <a:xfrm flipV="1">
-              <a:off x="2316162" y="548481"/>
-              <a:ext cx="0" cy="914400"/>
-            </a:xfrm>
-            <a:prstGeom prst="straightConnector1">
-              <a:avLst/>
-            </a:prstGeom>
-            <a:ln>
-              <a:solidFill>
-                <a:srgbClr val="170CFA"/>
-              </a:solidFill>
-              <a:prstDash val="solid"/>
-              <a:tailEnd type="arrow"/>
-            </a:ln>
-          </p:spPr>
-          <p:style>
-            <a:lnRef idx="1">
-              <a:schemeClr val="accent1"/>
-            </a:lnRef>
-            <a:fillRef idx="0">
-              <a:schemeClr val="accent1"/>
-            </a:fillRef>
-            <a:effectRef idx="0">
-              <a:schemeClr val="accent1"/>
-            </a:effectRef>
-            <a:fontRef idx="minor">
-              <a:schemeClr val="tx1"/>
-            </a:fontRef>
-          </p:style>
-        </p:cxnSp>
-        <p:cxnSp>
-          <p:nvCxnSpPr>
-            <p:cNvPr id="73" name="Straight Arrow Connector 72"/>
-            <p:cNvCxnSpPr/>
-            <p:nvPr/>
-          </p:nvCxnSpPr>
-          <p:spPr>
-            <a:xfrm flipV="1">
-              <a:off x="2392362" y="390701"/>
-              <a:ext cx="0" cy="919780"/>
-            </a:xfrm>
-            <a:prstGeom prst="straightConnector1">
-              <a:avLst/>
-            </a:prstGeom>
-            <a:ln>
-              <a:solidFill>
-                <a:srgbClr val="FF0000"/>
-              </a:solidFill>
-              <a:tailEnd type="arrow"/>
-            </a:ln>
-          </p:spPr>
-          <p:style>
-            <a:lnRef idx="1">
-              <a:schemeClr val="accent1"/>
-            </a:lnRef>
-            <a:fillRef idx="0">
-              <a:schemeClr val="accent1"/>
-            </a:fillRef>
-            <a:effectRef idx="0">
-              <a:schemeClr val="accent1"/>
-            </a:effectRef>
-            <a:fontRef idx="minor">
-              <a:schemeClr val="tx1"/>
-            </a:fontRef>
-          </p:style>
-        </p:cxnSp>
-        <p:cxnSp>
-          <p:nvCxnSpPr>
-            <p:cNvPr id="74" name="Straight Arrow Connector 73"/>
-            <p:cNvCxnSpPr/>
-            <p:nvPr/>
-          </p:nvCxnSpPr>
-          <p:spPr>
-            <a:xfrm flipV="1">
-              <a:off x="2620962" y="1310481"/>
-              <a:ext cx="0" cy="152400"/>
-            </a:xfrm>
-            <a:prstGeom prst="straightConnector1">
-              <a:avLst/>
-            </a:prstGeom>
-            <a:ln>
-              <a:solidFill>
-                <a:srgbClr val="170CFA"/>
-              </a:solidFill>
-              <a:prstDash val="sysDash"/>
-              <a:tailEnd type="arrow"/>
-            </a:ln>
-          </p:spPr>
-          <p:style>
-            <a:lnRef idx="1">
-              <a:schemeClr val="accent1"/>
-            </a:lnRef>
-            <a:fillRef idx="0">
-              <a:schemeClr val="accent1"/>
-            </a:fillRef>
-            <a:effectRef idx="0">
-              <a:schemeClr val="accent1"/>
-            </a:effectRef>
-            <a:fontRef idx="minor">
-              <a:schemeClr val="tx1"/>
-            </a:fontRef>
-          </p:style>
-        </p:cxnSp>
-        <p:cxnSp>
-          <p:nvCxnSpPr>
-            <p:cNvPr id="75" name="Straight Arrow Connector 74"/>
-            <p:cNvCxnSpPr/>
-            <p:nvPr/>
-          </p:nvCxnSpPr>
-          <p:spPr>
-            <a:xfrm flipV="1">
-              <a:off x="2620962" y="396081"/>
-              <a:ext cx="0" cy="152400"/>
-            </a:xfrm>
-            <a:prstGeom prst="straightConnector1">
-              <a:avLst/>
-            </a:prstGeom>
-            <a:ln>
-              <a:solidFill>
-                <a:srgbClr val="FF0000"/>
-              </a:solidFill>
-              <a:tailEnd type="arrow"/>
-            </a:ln>
-          </p:spPr>
-          <p:style>
-            <a:lnRef idx="1">
-              <a:schemeClr val="accent1"/>
-            </a:lnRef>
-            <a:fillRef idx="0">
-              <a:schemeClr val="accent1"/>
-            </a:fillRef>
-            <a:effectRef idx="0">
-              <a:schemeClr val="accent1"/>
-            </a:effectRef>
-            <a:fontRef idx="minor">
-              <a:schemeClr val="tx1"/>
-            </a:fontRef>
-          </p:style>
-        </p:cxnSp>
-        <p:sp>
-          <p:nvSpPr>
-            <p:cNvPr id="76" name="TextBox 75"/>
-            <p:cNvSpPr txBox="1"/>
-            <p:nvPr/>
-          </p:nvSpPr>
-          <p:spPr>
-            <a:xfrm>
-              <a:off x="1513514" y="-44933"/>
-              <a:ext cx="292068" cy="246220"/>
-            </a:xfrm>
-            <a:prstGeom prst="rect">
-              <a:avLst/>
-            </a:prstGeom>
-            <a:noFill/>
-          </p:spPr>
-          <p:txBody>
-            <a:bodyPr wrap="none" rtlCol="0">
-              <a:spAutoFit/>
-            </a:bodyPr>
-            <a:lstStyle/>
-            <a:p>
-              <a:r>
-                <a:rPr lang="en-US" sz="1000" dirty="0" smtClean="0"/>
-                <a:t>E</a:t>
-              </a:r>
-              <a:r>
-                <a:rPr lang="en-US" sz="1000" baseline="-25000" dirty="0" smtClean="0"/>
-                <a:t>n</a:t>
-              </a:r>
-              <a:endParaRPr lang="en-US" sz="1000" dirty="0"/>
-            </a:p>
-          </p:txBody>
-        </p:sp>
-        <p:sp>
-          <p:nvSpPr>
-            <p:cNvPr id="77" name="TextBox 76"/>
-            <p:cNvSpPr txBox="1"/>
-            <p:nvPr/>
-          </p:nvSpPr>
-          <p:spPr>
-            <a:xfrm>
-              <a:off x="2697162" y="813336"/>
-              <a:ext cx="381836" cy="246221"/>
-            </a:xfrm>
-            <a:prstGeom prst="rect">
-              <a:avLst/>
-            </a:prstGeom>
-            <a:noFill/>
-          </p:spPr>
-          <p:txBody>
-            <a:bodyPr wrap="none" rtlCol="0">
-              <a:spAutoFit/>
-            </a:bodyPr>
-            <a:lstStyle/>
-            <a:p>
-              <a:r>
-                <a:rPr lang="en-US" sz="1000" dirty="0" smtClean="0"/>
-                <a:t>n=0</a:t>
-              </a:r>
-              <a:endParaRPr lang="en-US" sz="1000" dirty="0"/>
-            </a:p>
-          </p:txBody>
-        </p:sp>
-        <p:sp>
-          <p:nvSpPr>
-            <p:cNvPr id="78" name="TextBox 77"/>
-            <p:cNvSpPr txBox="1"/>
-            <p:nvPr/>
-          </p:nvSpPr>
-          <p:spPr>
-            <a:xfrm>
-              <a:off x="2697162" y="448453"/>
-              <a:ext cx="360996" cy="230832"/>
-            </a:xfrm>
-            <a:prstGeom prst="rect">
-              <a:avLst/>
-            </a:prstGeom>
-            <a:noFill/>
-          </p:spPr>
-          <p:txBody>
-            <a:bodyPr wrap="none" rtlCol="0">
-              <a:spAutoFit/>
-            </a:bodyPr>
-            <a:lstStyle/>
-            <a:p>
-              <a:r>
-                <a:rPr lang="en-US" sz="900" dirty="0" smtClean="0"/>
-                <a:t>n=1</a:t>
-              </a:r>
-              <a:endParaRPr lang="en-US" sz="900" dirty="0"/>
-            </a:p>
-          </p:txBody>
-        </p:sp>
-        <p:sp>
-          <p:nvSpPr>
-            <p:cNvPr id="79" name="TextBox 78"/>
-            <p:cNvSpPr txBox="1"/>
-            <p:nvPr/>
-          </p:nvSpPr>
-          <p:spPr>
-            <a:xfrm>
-              <a:off x="2697162" y="280534"/>
-              <a:ext cx="360996" cy="230832"/>
-            </a:xfrm>
-            <a:prstGeom prst="rect">
-              <a:avLst/>
-            </a:prstGeom>
-            <a:noFill/>
-          </p:spPr>
-          <p:txBody>
-            <a:bodyPr wrap="none" rtlCol="0">
-              <a:spAutoFit/>
-            </a:bodyPr>
-            <a:lstStyle/>
-            <a:p>
-              <a:r>
-                <a:rPr lang="en-US" sz="900" dirty="0" smtClean="0"/>
-                <a:t>n=2</a:t>
-              </a:r>
-              <a:endParaRPr lang="en-US" sz="900" dirty="0"/>
-            </a:p>
-          </p:txBody>
-        </p:sp>
-        <p:sp>
-          <p:nvSpPr>
-            <p:cNvPr id="80" name="TextBox 79"/>
-            <p:cNvSpPr txBox="1"/>
-            <p:nvPr/>
-          </p:nvSpPr>
-          <p:spPr>
-            <a:xfrm>
-              <a:off x="2697162" y="1210178"/>
-              <a:ext cx="420308" cy="246221"/>
-            </a:xfrm>
-            <a:prstGeom prst="rect">
-              <a:avLst/>
-            </a:prstGeom>
-            <a:noFill/>
-          </p:spPr>
-          <p:txBody>
-            <a:bodyPr wrap="none" rtlCol="0">
-              <a:spAutoFit/>
-            </a:bodyPr>
-            <a:lstStyle/>
-            <a:p>
-              <a:r>
-                <a:rPr lang="en-US" sz="1000" dirty="0" smtClean="0"/>
-                <a:t>n=-1</a:t>
-              </a:r>
-              <a:endParaRPr lang="en-US" sz="1000" dirty="0"/>
-            </a:p>
-          </p:txBody>
-        </p:sp>
-        <p:sp>
-          <p:nvSpPr>
-            <p:cNvPr id="81" name="TextBox 80"/>
-            <p:cNvSpPr txBox="1"/>
-            <p:nvPr/>
-          </p:nvSpPr>
-          <p:spPr>
-            <a:xfrm>
-              <a:off x="2697162" y="1362853"/>
-              <a:ext cx="420308" cy="246221"/>
-            </a:xfrm>
-            <a:prstGeom prst="rect">
-              <a:avLst/>
-            </a:prstGeom>
-            <a:noFill/>
-          </p:spPr>
-          <p:txBody>
-            <a:bodyPr wrap="none" rtlCol="0">
-              <a:spAutoFit/>
-            </a:bodyPr>
-            <a:lstStyle/>
-            <a:p>
-              <a:r>
-                <a:rPr lang="en-US" sz="1000" dirty="0" smtClean="0"/>
-                <a:t>n=-2</a:t>
-              </a:r>
-              <a:endParaRPr lang="en-US" sz="1000" dirty="0"/>
-            </a:p>
-          </p:txBody>
-        </p:sp>
-        <mc:AlternateContent xmlns:mc="http://schemas.openxmlformats.org/markup-compatibility/2006" xmlns:a14="http://schemas.microsoft.com/office/drawing/2010/main">
-          <mc:Choice Requires="a14">
-            <p:sp>
-              <p:nvSpPr>
-                <p:cNvPr id="82" name="TextBox 81"/>
-                <p:cNvSpPr txBox="1"/>
-                <p:nvPr/>
-              </p:nvSpPr>
-              <p:spPr>
-                <a:xfrm>
-                  <a:off x="1940474" y="-159282"/>
-                  <a:ext cx="1119975" cy="352088"/>
-                </a:xfrm>
-                <a:prstGeom prst="rect">
-                  <a:avLst/>
-                </a:prstGeom>
-                <a:noFill/>
-                <a:ln>
-                  <a:solidFill>
-                    <a:schemeClr val="tx1"/>
-                  </a:solidFill>
-                </a:ln>
-              </p:spPr>
-              <p:txBody>
-                <a:bodyPr wrap="square" rtlCol="0">
-                  <a:spAutoFit/>
-                </a:bodyPr>
-                <a:lstStyle/>
-                <a:p>
-                  <a:pPr/>
-                  <a14:m>
-                    <m:oMathPara xmlns:m="http://schemas.openxmlformats.org/officeDocument/2006/math">
-                      <m:oMathParaPr>
-                        <m:jc m:val="centerGroup"/>
-                      </m:oMathParaPr>
-                      <m:oMath xmlns:m="http://schemas.openxmlformats.org/officeDocument/2006/math">
-                        <m:r>
-                          <m:rPr>
-                            <m:sty m:val="p"/>
-                          </m:rPr>
-                          <a:rPr lang="en-US" sz="800" b="0" i="0" smtClean="0">
-                            <a:latin typeface="Cambria Math"/>
-                          </a:rPr>
-                          <m:t>Δ</m:t>
-                        </m:r>
-                        <m:r>
-                          <a:rPr lang="en-US" sz="800" b="0" i="1" smtClean="0">
-                            <a:latin typeface="Cambria Math"/>
-                          </a:rPr>
-                          <m:t>𝑛</m:t>
-                        </m:r>
-                        <m:r>
-                          <a:rPr lang="en-US" sz="800" b="0" i="1" smtClean="0">
-                            <a:latin typeface="Cambria Math"/>
-                          </a:rPr>
-                          <m:t>=±1</m:t>
-                        </m:r>
-                      </m:oMath>
-                    </m:oMathPara>
-                  </a14:m>
-                  <a:endParaRPr lang="en-US" sz="800" b="0" dirty="0" smtClean="0"/>
-                </a:p>
-                <a:p>
-                  <a:pPr algn="ctr"/>
-                  <a:r>
-                    <a:rPr lang="en-US" sz="800" dirty="0" smtClean="0"/>
-                    <a:t>B=12.6T</a:t>
-                  </a:r>
-                  <a:endParaRPr lang="en-US" sz="800" dirty="0"/>
-                </a:p>
-              </p:txBody>
-            </p:sp>
-          </mc:Choice>
-          <mc:Fallback xmlns="">
-            <p:sp>
-              <p:nvSpPr>
-                <p:cNvPr id="46" name="TextBox 45"/>
-                <p:cNvSpPr txBox="1">
-                  <a:spLocks noRot="1" noChangeAspect="1" noMove="1" noResize="1" noEditPoints="1" noAdjustHandles="1" noChangeArrowheads="1" noChangeShapeType="1" noTextEdit="1"/>
-                </p:cNvSpPr>
-                <p:nvPr/>
-              </p:nvSpPr>
-              <p:spPr>
-                <a:xfrm>
-                  <a:off x="1940474" y="-159282"/>
-                  <a:ext cx="1119975" cy="352088"/>
-                </a:xfrm>
-                <a:prstGeom prst="rect">
-                  <a:avLst/>
-                </a:prstGeom>
-                <a:blipFill rotWithShape="1">
-                  <a:blip r:embed="rId4"/>
-                  <a:stretch>
-                    <a:fillRect b="-3448"/>
-                  </a:stretch>
-                </a:blipFill>
-                <a:ln>
-                  <a:solidFill>
-                    <a:schemeClr val="tx1"/>
-                  </a:solidFill>
-                </a:ln>
-              </p:spPr>
-              <p:txBody>
-                <a:bodyPr/>
-                <a:lstStyle/>
-                <a:p>
-                  <a:r>
-                    <a:rPr lang="en-US">
-                      <a:noFill/>
-                    </a:rPr>
-                    <a:t> </a:t>
-                  </a:r>
-                </a:p>
-              </p:txBody>
-            </p:sp>
-          </mc:Fallback>
-        </mc:AlternateContent>
-      </p:grpSp>
-      <p:grpSp>
-        <p:nvGrpSpPr>
-          <p:cNvPr id="2" name="Group 1"/>
-          <p:cNvGrpSpPr/>
-          <p:nvPr/>
-        </p:nvGrpSpPr>
-        <p:grpSpPr>
-          <a:xfrm>
-            <a:off x="2670376" y="2253686"/>
-            <a:ext cx="588980" cy="265425"/>
-            <a:chOff x="2149580" y="2253686"/>
-            <a:chExt cx="1032863" cy="265425"/>
-          </a:xfrm>
-        </p:grpSpPr>
-        <p:sp>
-          <p:nvSpPr>
-            <p:cNvPr id="83" name="TextBox 82"/>
-            <p:cNvSpPr txBox="1"/>
-            <p:nvPr/>
-          </p:nvSpPr>
-          <p:spPr>
-            <a:xfrm>
-              <a:off x="2149580" y="2267542"/>
-              <a:ext cx="290464" cy="246221"/>
-            </a:xfrm>
-            <a:prstGeom prst="rect">
-              <a:avLst/>
-            </a:prstGeom>
-            <a:noFill/>
-          </p:spPr>
-          <p:txBody>
-            <a:bodyPr wrap="none" rtlCol="0">
-              <a:spAutoFit/>
-            </a:bodyPr>
-            <a:lstStyle/>
-            <a:p>
-              <a:r>
-                <a:rPr lang="en-US" sz="1000" dirty="0" smtClean="0"/>
-                <a:t>T</a:t>
-              </a:r>
-              <a:r>
-                <a:rPr lang="en-US" sz="1000" baseline="-25000" dirty="0" smtClean="0"/>
-                <a:t>0</a:t>
-              </a:r>
-              <a:endParaRPr lang="en-US" sz="1000" dirty="0"/>
-            </a:p>
-          </p:txBody>
-        </p:sp>
-        <p:sp>
-          <p:nvSpPr>
-            <p:cNvPr id="84" name="TextBox 83"/>
-            <p:cNvSpPr txBox="1"/>
-            <p:nvPr/>
-          </p:nvSpPr>
-          <p:spPr>
-            <a:xfrm>
-              <a:off x="2604721" y="2253686"/>
-              <a:ext cx="290464" cy="246221"/>
-            </a:xfrm>
-            <a:prstGeom prst="rect">
-              <a:avLst/>
-            </a:prstGeom>
-            <a:noFill/>
-          </p:spPr>
-          <p:txBody>
-            <a:bodyPr wrap="none" rtlCol="0">
-              <a:spAutoFit/>
-            </a:bodyPr>
-            <a:lstStyle/>
-            <a:p>
-              <a:r>
-                <a:rPr lang="en-US" sz="1000" dirty="0" smtClean="0"/>
-                <a:t>T</a:t>
-              </a:r>
-              <a:r>
-                <a:rPr lang="en-US" sz="1000" baseline="-25000" dirty="0"/>
-                <a:t>1</a:t>
-              </a:r>
-              <a:endParaRPr lang="en-US" sz="1000" dirty="0"/>
-            </a:p>
-          </p:txBody>
-        </p:sp>
-        <p:sp>
-          <p:nvSpPr>
-            <p:cNvPr id="85" name="TextBox 84"/>
-            <p:cNvSpPr txBox="1"/>
-            <p:nvPr/>
-          </p:nvSpPr>
-          <p:spPr>
-            <a:xfrm>
-              <a:off x="2895185" y="2272890"/>
-              <a:ext cx="287258" cy="246221"/>
-            </a:xfrm>
-            <a:prstGeom prst="rect">
-              <a:avLst/>
-            </a:prstGeom>
-            <a:noFill/>
-          </p:spPr>
-          <p:txBody>
-            <a:bodyPr wrap="none" rtlCol="0">
-              <a:spAutoFit/>
-            </a:bodyPr>
-            <a:lstStyle/>
-            <a:p>
-              <a:r>
-                <a:rPr lang="en-US" sz="1000" dirty="0" smtClean="0"/>
-                <a:t>S</a:t>
-              </a:r>
-              <a:r>
-                <a:rPr lang="en-US" sz="1000" baseline="-25000" dirty="0" smtClean="0"/>
-                <a:t>1</a:t>
-              </a:r>
-              <a:endParaRPr lang="en-US" sz="1000" dirty="0"/>
-            </a:p>
-          </p:txBody>
-        </p:sp>
-      </p:grpSp>
-      <p:sp>
-        <p:nvSpPr>
-          <p:cNvPr id="86" name="TextBox 85"/>
-          <p:cNvSpPr txBox="1"/>
-          <p:nvPr/>
-        </p:nvSpPr>
-        <p:spPr>
-          <a:xfrm>
-            <a:off x="67529" y="-18810"/>
-            <a:ext cx="284052" cy="246221"/>
-          </a:xfrm>
-          <a:prstGeom prst="rect">
-            <a:avLst/>
-          </a:prstGeom>
-          <a:noFill/>
-        </p:spPr>
-        <p:txBody>
-          <a:bodyPr wrap="none" rtlCol="0">
-            <a:spAutoFit/>
-          </a:bodyPr>
-          <a:lstStyle/>
-          <a:p>
-            <a:r>
-              <a:rPr lang="en-US" sz="1000" dirty="0" smtClean="0"/>
-              <a:t>a)</a:t>
-            </a:r>
-            <a:endParaRPr lang="en-US" sz="1000" dirty="0"/>
-          </a:p>
-        </p:txBody>
-      </p:sp>
-      <p:sp>
-        <p:nvSpPr>
-          <p:cNvPr id="87" name="TextBox 86"/>
-          <p:cNvSpPr txBox="1"/>
-          <p:nvPr/>
-        </p:nvSpPr>
-        <p:spPr>
-          <a:xfrm>
-            <a:off x="2362200" y="-18808"/>
-            <a:ext cx="290464" cy="246221"/>
-          </a:xfrm>
-          <a:prstGeom prst="rect">
-            <a:avLst/>
-          </a:prstGeom>
-          <a:noFill/>
-        </p:spPr>
-        <p:txBody>
-          <a:bodyPr wrap="none" rtlCol="0">
-            <a:spAutoFit/>
-          </a:bodyPr>
-          <a:lstStyle/>
-          <a:p>
-            <a:r>
-              <a:rPr lang="en-US" sz="1000" dirty="0"/>
-              <a:t>b</a:t>
-            </a:r>
-            <a:r>
-              <a:rPr lang="en-US" sz="1000" dirty="0" smtClean="0"/>
-              <a:t>)</a:t>
-            </a:r>
-            <a:endParaRPr lang="en-US" sz="1000" dirty="0"/>
-          </a:p>
-        </p:txBody>
-      </p:sp>
-      <p:sp>
-        <p:nvSpPr>
-          <p:cNvPr id="88" name="TextBox 87"/>
-          <p:cNvSpPr txBox="1"/>
-          <p:nvPr/>
-        </p:nvSpPr>
-        <p:spPr>
-          <a:xfrm>
-            <a:off x="3505200" y="-18809"/>
-            <a:ext cx="277640" cy="246221"/>
-          </a:xfrm>
-          <a:prstGeom prst="rect">
-            <a:avLst/>
-          </a:prstGeom>
-          <a:noFill/>
-        </p:spPr>
-        <p:txBody>
-          <a:bodyPr wrap="none" rtlCol="0">
-            <a:spAutoFit/>
-          </a:bodyPr>
-          <a:lstStyle/>
-          <a:p>
-            <a:r>
-              <a:rPr lang="en-US" sz="1000" dirty="0" smtClean="0"/>
-              <a:t>c)</a:t>
-            </a:r>
-            <a:endParaRPr lang="en-US" sz="1000" dirty="0"/>
-          </a:p>
-        </p:txBody>
-      </p:sp>
     </p:spTree>
     <p:extLst>
       <p:ext uri="{BB962C8B-B14F-4D97-AF65-F5344CB8AC3E}">

</xml_diff>